<commit_message>
Abr commit korsi ami
</commit_message>
<xml_diff>
--- a/DLC 23-53829-3.pptx
+++ b/DLC 23-53829-3.pptx
@@ -12,8 +12,6 @@
     <p:sldId id="261" r:id="rId6"/>
     <p:sldId id="260" r:id="rId7"/>
     <p:sldId id="262" r:id="rId8"/>
-    <p:sldId id="263" r:id="rId9"/>
-    <p:sldId id="264" r:id="rId10"/>
   </p:sldIdLst>
   <p:sldSz cx="9144000" cy="6858000" type="screen4x3"/>
   <p:notesSz cx="6858000" cy="9144000"/>
@@ -251,7 +249,7 @@
           <a:p>
             <a:fld id="{EBE37FAD-E095-CB45-BCA9-B0138BE87955}" type="datetimeFigureOut">
               <a:rPr lang="en-US" smtClean="0"/>
-              <a:t>17-Sep-25</a:t>
+              <a:t>29-Oct-25</a:t>
             </a:fld>
             <a:endParaRPr lang="en-US"/>
           </a:p>
@@ -421,7 +419,7 @@
           <a:p>
             <a:fld id="{EBE37FAD-E095-CB45-BCA9-B0138BE87955}" type="datetimeFigureOut">
               <a:rPr lang="en-US" smtClean="0"/>
-              <a:t>17-Sep-25</a:t>
+              <a:t>29-Oct-25</a:t>
             </a:fld>
             <a:endParaRPr lang="en-US"/>
           </a:p>
@@ -601,7 +599,7 @@
           <a:p>
             <a:fld id="{EBE37FAD-E095-CB45-BCA9-B0138BE87955}" type="datetimeFigureOut">
               <a:rPr lang="en-US" smtClean="0"/>
-              <a:t>17-Sep-25</a:t>
+              <a:t>29-Oct-25</a:t>
             </a:fld>
             <a:endParaRPr lang="en-US"/>
           </a:p>
@@ -771,7 +769,7 @@
           <a:p>
             <a:fld id="{EBE37FAD-E095-CB45-BCA9-B0138BE87955}" type="datetimeFigureOut">
               <a:rPr lang="en-US" smtClean="0"/>
-              <a:t>17-Sep-25</a:t>
+              <a:t>29-Oct-25</a:t>
             </a:fld>
             <a:endParaRPr lang="en-US"/>
           </a:p>
@@ -1017,7 +1015,7 @@
           <a:p>
             <a:fld id="{EBE37FAD-E095-CB45-BCA9-B0138BE87955}" type="datetimeFigureOut">
               <a:rPr lang="en-US" smtClean="0"/>
-              <a:t>17-Sep-25</a:t>
+              <a:t>29-Oct-25</a:t>
             </a:fld>
             <a:endParaRPr lang="en-US"/>
           </a:p>
@@ -1249,7 +1247,7 @@
           <a:p>
             <a:fld id="{EBE37FAD-E095-CB45-BCA9-B0138BE87955}" type="datetimeFigureOut">
               <a:rPr lang="en-US" smtClean="0"/>
-              <a:t>17-Sep-25</a:t>
+              <a:t>29-Oct-25</a:t>
             </a:fld>
             <a:endParaRPr lang="en-US"/>
           </a:p>
@@ -1616,7 +1614,7 @@
           <a:p>
             <a:fld id="{EBE37FAD-E095-CB45-BCA9-B0138BE87955}" type="datetimeFigureOut">
               <a:rPr lang="en-US" smtClean="0"/>
-              <a:t>17-Sep-25</a:t>
+              <a:t>29-Oct-25</a:t>
             </a:fld>
             <a:endParaRPr lang="en-US"/>
           </a:p>
@@ -1734,7 +1732,7 @@
           <a:p>
             <a:fld id="{EBE37FAD-E095-CB45-BCA9-B0138BE87955}" type="datetimeFigureOut">
               <a:rPr lang="en-US" smtClean="0"/>
-              <a:t>17-Sep-25</a:t>
+              <a:t>29-Oct-25</a:t>
             </a:fld>
             <a:endParaRPr lang="en-US"/>
           </a:p>
@@ -1829,7 +1827,7 @@
           <a:p>
             <a:fld id="{EBE37FAD-E095-CB45-BCA9-B0138BE87955}" type="datetimeFigureOut">
               <a:rPr lang="en-US" smtClean="0"/>
-              <a:t>17-Sep-25</a:t>
+              <a:t>29-Oct-25</a:t>
             </a:fld>
             <a:endParaRPr lang="en-US"/>
           </a:p>
@@ -2106,7 +2104,7 @@
           <a:p>
             <a:fld id="{EBE37FAD-E095-CB45-BCA9-B0138BE87955}" type="datetimeFigureOut">
               <a:rPr lang="en-US" smtClean="0"/>
-              <a:t>17-Sep-25</a:t>
+              <a:t>29-Oct-25</a:t>
             </a:fld>
             <a:endParaRPr lang="en-US"/>
           </a:p>
@@ -2363,7 +2361,7 @@
           <a:p>
             <a:fld id="{EBE37FAD-E095-CB45-BCA9-B0138BE87955}" type="datetimeFigureOut">
               <a:rPr lang="en-US" smtClean="0"/>
-              <a:t>17-Sep-25</a:t>
+              <a:t>29-Oct-25</a:t>
             </a:fld>
             <a:endParaRPr lang="en-US"/>
           </a:p>
@@ -2576,7 +2574,7 @@
           <a:p>
             <a:fld id="{EBE37FAD-E095-CB45-BCA9-B0138BE87955}" type="datetimeFigureOut">
               <a:rPr lang="en-US" smtClean="0"/>
-              <a:t>17-Sep-25</a:t>
+              <a:t>29-Oct-25</a:t>
             </a:fld>
             <a:endParaRPr lang="en-US"/>
           </a:p>
@@ -4731,274 +4729,6 @@
     <p:extLst>
       <p:ext uri="{BB962C8B-B14F-4D97-AF65-F5344CB8AC3E}">
         <p14:creationId xmlns:p14="http://schemas.microsoft.com/office/powerpoint/2010/main" val="1049090195"/>
-      </p:ext>
-    </p:extLst>
-  </p:cSld>
-  <p:clrMapOvr>
-    <a:masterClrMapping/>
-  </p:clrMapOvr>
-</p:sld>
-</file>
-
-<file path=ppt/slides/slide8.xml><?xml version="1.0" encoding="utf-8"?>
-<p:sld xmlns:a="http://schemas.openxmlformats.org/drawingml/2006/main" xmlns:r="http://schemas.openxmlformats.org/officeDocument/2006/relationships" xmlns:p="http://schemas.openxmlformats.org/presentationml/2006/main">
-  <p:cSld>
-    <p:spTree>
-      <p:nvGrpSpPr>
-        <p:cNvPr id="1" name=""/>
-        <p:cNvGrpSpPr/>
-        <p:nvPr/>
-      </p:nvGrpSpPr>
-      <p:grpSpPr>
-        <a:xfrm>
-          <a:off x="0" y="0"/>
-          <a:ext cx="0" cy="0"/>
-          <a:chOff x="0" y="0"/>
-          <a:chExt cx="0" cy="0"/>
-        </a:xfrm>
-      </p:grpSpPr>
-      <p:sp>
-        <p:nvSpPr>
-          <p:cNvPr id="5" name="TextBox 4">
-            <a:extLst>
-              <a:ext uri="{FF2B5EF4-FFF2-40B4-BE49-F238E27FC236}">
-                <a16:creationId xmlns:a16="http://schemas.microsoft.com/office/drawing/2014/main" id="{6C643D11-ECED-83BB-67DF-CF9C7D4B052F}"/>
-              </a:ext>
-            </a:extLst>
-          </p:cNvPr>
-          <p:cNvSpPr txBox="1"/>
-          <p:nvPr/>
-        </p:nvSpPr>
-        <p:spPr>
-          <a:xfrm>
-            <a:off x="273050" y="98336"/>
-            <a:ext cx="8597900" cy="646331"/>
-          </a:xfrm>
-          <a:prstGeom prst="rect">
-            <a:avLst/>
-          </a:prstGeom>
-          <a:noFill/>
-        </p:spPr>
-        <p:txBody>
-          <a:bodyPr wrap="square">
-            <a:spAutoFit/>
-          </a:bodyPr>
-          <a:lstStyle/>
-          <a:p>
-            <a:pPr>
-              <a:buNone/>
-            </a:pPr>
-            <a:r>
-              <a:rPr lang="en-US" dirty="0">
-                <a:solidFill>
-                  <a:srgbClr val="000000"/>
-                </a:solidFill>
-                <a:effectLst/>
-                <a:latin typeface="Times New Roman" panose="02020603050405020304" pitchFamily="18" charset="0"/>
-              </a:rPr>
-              <a:t>5.</a:t>
-            </a:r>
-            <a:r>
-              <a:rPr lang="en-US" dirty="0">
-                <a:solidFill>
-                  <a:srgbClr val="000000"/>
-                </a:solidFill>
-                <a:effectLst/>
-                <a:latin typeface="Arial" panose="020B0604020202020204" pitchFamily="34" charset="0"/>
-              </a:rPr>
-              <a:t> </a:t>
-            </a:r>
-            <a:r>
-              <a:rPr lang="en-US" b="1" dirty="0">
-                <a:solidFill>
-                  <a:srgbClr val="000000"/>
-                </a:solidFill>
-                <a:effectLst/>
-                <a:latin typeface="Times New Roman" panose="02020603050405020304" pitchFamily="18" charset="0"/>
-              </a:rPr>
-              <a:t>Show</a:t>
-            </a:r>
-            <a:r>
-              <a:rPr lang="en-US" dirty="0">
-                <a:solidFill>
-                  <a:srgbClr val="000000"/>
-                </a:solidFill>
-                <a:effectLst/>
-                <a:latin typeface="Times New Roman" panose="02020603050405020304" pitchFamily="18" charset="0"/>
-              </a:rPr>
-              <a:t> how the </a:t>
-            </a:r>
-            <a:r>
-              <a:rPr lang="en-US" b="1" dirty="0">
-                <a:solidFill>
-                  <a:srgbClr val="000000"/>
-                </a:solidFill>
-                <a:effectLst/>
-                <a:latin typeface="Times New Roman" panose="02020603050405020304" pitchFamily="18" charset="0"/>
-              </a:rPr>
-              <a:t>DAC output voltage</a:t>
-            </a:r>
-            <a:r>
-              <a:rPr lang="en-US" dirty="0">
-                <a:solidFill>
-                  <a:srgbClr val="000000"/>
-                </a:solidFill>
-                <a:effectLst/>
-                <a:latin typeface="Times New Roman" panose="02020603050405020304" pitchFamily="18" charset="0"/>
-              </a:rPr>
-              <a:t> represents the passenger count for 5 and 10 passengers (assume 4-bit DAC, </a:t>
-            </a:r>
-            <a:r>
-              <a:rPr lang="en-US" dirty="0" err="1">
-                <a:solidFill>
-                  <a:srgbClr val="000000"/>
-                </a:solidFill>
-                <a:effectLst/>
-                <a:latin typeface="Times New Roman" panose="02020603050405020304" pitchFamily="18" charset="0"/>
-              </a:rPr>
-              <a:t>Vref</a:t>
-            </a:r>
-            <a:r>
-              <a:rPr lang="en-US" dirty="0">
-                <a:solidFill>
-                  <a:srgbClr val="000000"/>
-                </a:solidFill>
-                <a:effectLst/>
-                <a:latin typeface="Times New Roman" panose="02020603050405020304" pitchFamily="18" charset="0"/>
-              </a:rPr>
-              <a:t> = 5 V).</a:t>
-            </a:r>
-          </a:p>
-        </p:txBody>
-      </p:sp>
-    </p:spTree>
-    <p:extLst>
-      <p:ext uri="{BB962C8B-B14F-4D97-AF65-F5344CB8AC3E}">
-        <p14:creationId xmlns:p14="http://schemas.microsoft.com/office/powerpoint/2010/main" val="3791819802"/>
-      </p:ext>
-    </p:extLst>
-  </p:cSld>
-  <p:clrMapOvr>
-    <a:masterClrMapping/>
-  </p:clrMapOvr>
-</p:sld>
-</file>
-
-<file path=ppt/slides/slide9.xml><?xml version="1.0" encoding="utf-8"?>
-<p:sld xmlns:a="http://schemas.openxmlformats.org/drawingml/2006/main" xmlns:r="http://schemas.openxmlformats.org/officeDocument/2006/relationships" xmlns:p="http://schemas.openxmlformats.org/presentationml/2006/main">
-  <p:cSld>
-    <p:spTree>
-      <p:nvGrpSpPr>
-        <p:cNvPr id="1" name=""/>
-        <p:cNvGrpSpPr/>
-        <p:nvPr/>
-      </p:nvGrpSpPr>
-      <p:grpSpPr>
-        <a:xfrm>
-          <a:off x="0" y="0"/>
-          <a:ext cx="0" cy="0"/>
-          <a:chOff x="0" y="0"/>
-          <a:chExt cx="0" cy="0"/>
-        </a:xfrm>
-      </p:grpSpPr>
-      <p:sp>
-        <p:nvSpPr>
-          <p:cNvPr id="5" name="TextBox 4">
-            <a:extLst>
-              <a:ext uri="{FF2B5EF4-FFF2-40B4-BE49-F238E27FC236}">
-                <a16:creationId xmlns:a16="http://schemas.microsoft.com/office/drawing/2014/main" id="{B2322650-638D-4016-60F1-71CDCAF96214}"/>
-              </a:ext>
-            </a:extLst>
-          </p:cNvPr>
-          <p:cNvSpPr txBox="1"/>
-          <p:nvPr/>
-        </p:nvSpPr>
-        <p:spPr>
-          <a:xfrm>
-            <a:off x="304800" y="248335"/>
-            <a:ext cx="7747000" cy="369332"/>
-          </a:xfrm>
-          <a:prstGeom prst="rect">
-            <a:avLst/>
-          </a:prstGeom>
-          <a:noFill/>
-        </p:spPr>
-        <p:txBody>
-          <a:bodyPr wrap="square">
-            <a:spAutoFit/>
-          </a:bodyPr>
-          <a:lstStyle/>
-          <a:p>
-            <a:pPr>
-              <a:buNone/>
-            </a:pPr>
-            <a:r>
-              <a:rPr lang="en-US" dirty="0">
-                <a:solidFill>
-                  <a:srgbClr val="000000"/>
-                </a:solidFill>
-                <a:effectLst/>
-                <a:latin typeface="Times New Roman" panose="02020603050405020304" pitchFamily="18" charset="0"/>
-              </a:rPr>
-              <a:t>6.</a:t>
-            </a:r>
-            <a:r>
-              <a:rPr lang="en-US" dirty="0">
-                <a:solidFill>
-                  <a:srgbClr val="000000"/>
-                </a:solidFill>
-                <a:effectLst/>
-                <a:latin typeface="Arial" panose="020B0604020202020204" pitchFamily="34" charset="0"/>
-              </a:rPr>
-              <a:t> </a:t>
-            </a:r>
-            <a:r>
-              <a:rPr lang="en-US" b="1" dirty="0">
-                <a:solidFill>
-                  <a:srgbClr val="000000"/>
-                </a:solidFill>
-                <a:effectLst/>
-                <a:latin typeface="Times New Roman" panose="02020603050405020304" pitchFamily="18" charset="0"/>
-              </a:rPr>
-              <a:t>Illustrate</a:t>
-            </a:r>
-            <a:r>
-              <a:rPr lang="en-US" dirty="0">
-                <a:solidFill>
-                  <a:srgbClr val="000000"/>
-                </a:solidFill>
-                <a:effectLst/>
-                <a:latin typeface="Times New Roman" panose="02020603050405020304" pitchFamily="18" charset="0"/>
-              </a:rPr>
-              <a:t> </a:t>
-            </a:r>
-            <a:r>
-              <a:rPr lang="en-US" b="1" dirty="0">
-                <a:solidFill>
-                  <a:srgbClr val="000000"/>
-                </a:solidFill>
-                <a:effectLst/>
-                <a:latin typeface="Times New Roman" panose="02020603050405020304" pitchFamily="18" charset="0"/>
-              </a:rPr>
-              <a:t>limitations</a:t>
-            </a:r>
-            <a:r>
-              <a:rPr lang="en-US" dirty="0">
-                <a:solidFill>
-                  <a:srgbClr val="000000"/>
-                </a:solidFill>
-                <a:effectLst/>
-                <a:latin typeface="Times New Roman" panose="02020603050405020304" pitchFamily="18" charset="0"/>
-              </a:rPr>
-              <a:t> of this developed metro safety system.</a:t>
-            </a:r>
-          </a:p>
-        </p:txBody>
-      </p:sp>
-    </p:spTree>
-    <p:extLst>
-      <p:ext uri="{BB962C8B-B14F-4D97-AF65-F5344CB8AC3E}">
-        <p14:creationId xmlns:p14="http://schemas.microsoft.com/office/powerpoint/2010/main" val="3711742436"/>
       </p:ext>
     </p:extLst>
   </p:cSld>

</xml_diff>